<commit_message>
stuff done before weekly chat
</commit_message>
<xml_diff>
--- a/notes/Oct_26_averaging_and_toy2.pptx
+++ b/notes/Oct_26_averaging_and_toy2.pptx
@@ -10,9 +10,10 @@
     <p:sldId id="257" r:id="rId4"/>
     <p:sldId id="261" r:id="rId5"/>
     <p:sldId id="263" r:id="rId6"/>
-    <p:sldId id="262" r:id="rId7"/>
-    <p:sldId id="259" r:id="rId8"/>
-    <p:sldId id="260" r:id="rId9"/>
+    <p:sldId id="264" r:id="rId7"/>
+    <p:sldId id="262" r:id="rId8"/>
+    <p:sldId id="259" r:id="rId9"/>
+    <p:sldId id="260" r:id="rId10"/>
   </p:sldIdLst>
   <p:sldSz cx="12192000" cy="6858000"/>
   <p:notesSz cx="6858000" cy="9144000"/>
@@ -122,7 +123,7 @@
 <file path=ppt/revisionInfo.xml><?xml version="1.0" encoding="utf-8"?>
 <p1510:revInfo xmlns:a="http://schemas.openxmlformats.org/drawingml/2006/main" xmlns:r="http://schemas.openxmlformats.org/officeDocument/2006/relationships" xmlns:p1510="http://schemas.microsoft.com/office/powerpoint/2015/10/main">
   <p1510:revLst>
-    <p1510:client id="{61DBC332-9CC0-465A-AB04-996F0238E80A}" v="74" dt="2021-11-01T20:11:29.383"/>
+    <p1510:client id="{61DBC332-9CC0-465A-AB04-996F0238E80A}" v="115" dt="2021-11-01T21:24:07.327"/>
   </p1510:revLst>
 </p1510:revInfo>
 </file>
@@ -132,7 +133,7 @@
   <pc:docChgLst>
     <pc:chgData name="Katie Johnston" userId="a8803450-7667-44c1-ac00-9653f319424f" providerId="ADAL" clId="{61DBC332-9CC0-465A-AB04-996F0238E80A}"/>
     <pc:docChg chg="undo custSel addSld modSld sldOrd">
-      <pc:chgData name="Katie Johnston" userId="a8803450-7667-44c1-ac00-9653f319424f" providerId="ADAL" clId="{61DBC332-9CC0-465A-AB04-996F0238E80A}" dt="2021-11-01T20:12:00.865" v="1012" actId="14100"/>
+      <pc:chgData name="Katie Johnston" userId="a8803450-7667-44c1-ac00-9653f319424f" providerId="ADAL" clId="{61DBC332-9CC0-465A-AB04-996F0238E80A}" dt="2021-11-01T21:24:09.758" v="1656" actId="1076"/>
       <pc:docMkLst>
         <pc:docMk/>
       </pc:docMkLst>
@@ -254,7 +255,7 @@
         </pc:picChg>
       </pc:sldChg>
       <pc:sldChg chg="addSp delSp modSp new mod">
-        <pc:chgData name="Katie Johnston" userId="a8803450-7667-44c1-ac00-9653f319424f" providerId="ADAL" clId="{61DBC332-9CC0-465A-AB04-996F0238E80A}" dt="2021-11-01T18:48:38.981" v="209" actId="1076"/>
+        <pc:chgData name="Katie Johnston" userId="a8803450-7667-44c1-ac00-9653f319424f" providerId="ADAL" clId="{61DBC332-9CC0-465A-AB04-996F0238E80A}" dt="2021-11-01T21:23:46.227" v="1654" actId="14100"/>
         <pc:sldMkLst>
           <pc:docMk/>
           <pc:sldMk cId="1374998937" sldId="260"/>
@@ -273,6 +274,14 @@
             <pc:docMk/>
             <pc:sldMk cId="1374998937" sldId="260"/>
             <ac:spMk id="3" creationId="{3A18400A-3E27-408E-B6F4-C76D2F8CF2E9}"/>
+          </ac:spMkLst>
+        </pc:spChg>
+        <pc:spChg chg="add mod">
+          <ac:chgData name="Katie Johnston" userId="a8803450-7667-44c1-ac00-9653f319424f" providerId="ADAL" clId="{61DBC332-9CC0-465A-AB04-996F0238E80A}" dt="2021-11-01T21:23:46.227" v="1654" actId="14100"/>
+          <ac:spMkLst>
+            <pc:docMk/>
+            <pc:sldMk cId="1374998937" sldId="260"/>
+            <ac:spMk id="4" creationId="{448F9F1A-9E05-47CB-8659-DA439FB6212D}"/>
           </ac:spMkLst>
         </pc:spChg>
         <pc:picChg chg="add mod">
@@ -341,7 +350,7 @@
         </pc:picChg>
       </pc:sldChg>
       <pc:sldChg chg="addSp delSp modSp new mod ord">
-        <pc:chgData name="Katie Johnston" userId="a8803450-7667-44c1-ac00-9653f319424f" providerId="ADAL" clId="{61DBC332-9CC0-465A-AB04-996F0238E80A}" dt="2021-11-01T20:12:00.865" v="1012" actId="14100"/>
+        <pc:chgData name="Katie Johnston" userId="a8803450-7667-44c1-ac00-9653f319424f" providerId="ADAL" clId="{61DBC332-9CC0-465A-AB04-996F0238E80A}" dt="2021-11-01T21:12:36.006" v="1541" actId="208"/>
         <pc:sldMkLst>
           <pc:docMk/>
           <pc:sldMk cId="3980966848" sldId="261"/>
@@ -394,6 +403,22 @@
             <ac:spMk id="12" creationId="{C9BB9DFC-FC5D-4E55-ADB9-4ED391863ADF}"/>
           </ac:spMkLst>
         </pc:spChg>
+        <pc:spChg chg="add mod">
+          <ac:chgData name="Katie Johnston" userId="a8803450-7667-44c1-ac00-9653f319424f" providerId="ADAL" clId="{61DBC332-9CC0-465A-AB04-996F0238E80A}" dt="2021-11-01T21:12:36.006" v="1541" actId="208"/>
+          <ac:spMkLst>
+            <pc:docMk/>
+            <pc:sldMk cId="3980966848" sldId="261"/>
+            <ac:spMk id="13" creationId="{EAB2BCC4-609B-4026-BB9B-082CC426E942}"/>
+          </ac:spMkLst>
+        </pc:spChg>
+        <pc:spChg chg="add del">
+          <ac:chgData name="Katie Johnston" userId="a8803450-7667-44c1-ac00-9653f319424f" providerId="ADAL" clId="{61DBC332-9CC0-465A-AB04-996F0238E80A}" dt="2021-11-01T21:12:08.555" v="1535" actId="22"/>
+          <ac:spMkLst>
+            <pc:docMk/>
+            <pc:sldMk cId="3980966848" sldId="261"/>
+            <ac:spMk id="17" creationId="{0ED9291A-57A4-4A2B-94A5-B690F45E9BC7}"/>
+          </ac:spMkLst>
+        </pc:spChg>
         <pc:picChg chg="add mod">
           <ac:chgData name="Katie Johnston" userId="a8803450-7667-44c1-ac00-9653f319424f" providerId="ADAL" clId="{61DBC332-9CC0-465A-AB04-996F0238E80A}" dt="2021-11-01T18:51:36.444" v="263" actId="1076"/>
           <ac:picMkLst>
@@ -408,6 +433,14 @@
             <pc:docMk/>
             <pc:sldMk cId="3980966848" sldId="261"/>
             <ac:picMk id="8" creationId="{5D1FAB56-FDAA-42CD-851C-340259D58A7A}"/>
+          </ac:picMkLst>
+        </pc:picChg>
+        <pc:picChg chg="add mod">
+          <ac:chgData name="Katie Johnston" userId="a8803450-7667-44c1-ac00-9653f319424f" providerId="ADAL" clId="{61DBC332-9CC0-465A-AB04-996F0238E80A}" dt="2021-11-01T21:12:17.932" v="1538" actId="1076"/>
+          <ac:picMkLst>
+            <pc:docMk/>
+            <pc:sldMk cId="3980966848" sldId="261"/>
+            <ac:picMk id="18" creationId="{BFC195A5-F42D-42F0-9E84-576DC1B49FEE}"/>
           </ac:picMkLst>
         </pc:picChg>
         <pc:picChg chg="add mod">
@@ -507,7 +540,7 @@
         </pc:picChg>
       </pc:sldChg>
       <pc:sldChg chg="addSp delSp modSp new mod">
-        <pc:chgData name="Katie Johnston" userId="a8803450-7667-44c1-ac00-9653f319424f" providerId="ADAL" clId="{61DBC332-9CC0-465A-AB04-996F0238E80A}" dt="2021-11-01T20:11:35.352" v="947" actId="20577"/>
+        <pc:chgData name="Katie Johnston" userId="a8803450-7667-44c1-ac00-9653f319424f" providerId="ADAL" clId="{61DBC332-9CC0-465A-AB04-996F0238E80A}" dt="2021-11-01T21:24:09.758" v="1656" actId="1076"/>
         <pc:sldMkLst>
           <pc:docMk/>
           <pc:sldMk cId="1488461104" sldId="263"/>
@@ -536,16 +569,40 @@
             <ac:spMk id="6" creationId="{99D46522-CDA1-49B1-BADD-ADAA1EE209AD}"/>
           </ac:spMkLst>
         </pc:spChg>
+        <pc:spChg chg="add mod">
+          <ac:chgData name="Katie Johnston" userId="a8803450-7667-44c1-ac00-9653f319424f" providerId="ADAL" clId="{61DBC332-9CC0-465A-AB04-996F0238E80A}" dt="2021-11-01T20:47:55.341" v="1444" actId="20577"/>
+          <ac:spMkLst>
+            <pc:docMk/>
+            <pc:sldMk cId="1488461104" sldId="263"/>
+            <ac:spMk id="7" creationId="{51855901-06C8-467A-8E7C-573C45A697A6}"/>
+          </ac:spMkLst>
+        </pc:spChg>
+        <pc:spChg chg="add del mod">
+          <ac:chgData name="Katie Johnston" userId="a8803450-7667-44c1-ac00-9653f319424f" providerId="ADAL" clId="{61DBC332-9CC0-465A-AB04-996F0238E80A}" dt="2021-11-01T20:54:16.206" v="1452" actId="21"/>
+          <ac:spMkLst>
+            <pc:docMk/>
+            <pc:sldMk cId="1488461104" sldId="263"/>
+            <ac:spMk id="8" creationId="{54BDB5A9-0BAA-41EE-89BE-1E54AE618829}"/>
+          </ac:spMkLst>
+        </pc:spChg>
+        <pc:spChg chg="add mod">
+          <ac:chgData name="Katie Johnston" userId="a8803450-7667-44c1-ac00-9653f319424f" providerId="ADAL" clId="{61DBC332-9CC0-465A-AB04-996F0238E80A}" dt="2021-11-01T21:24:09.758" v="1656" actId="1076"/>
+          <ac:spMkLst>
+            <pc:docMk/>
+            <pc:sldMk cId="1488461104" sldId="263"/>
+            <ac:spMk id="14" creationId="{CFA8F2F7-B5A9-424F-ACBC-EC396ACC862F}"/>
+          </ac:spMkLst>
+        </pc:spChg>
         <pc:picChg chg="add mod">
-          <ac:chgData name="Katie Johnston" userId="a8803450-7667-44c1-ac00-9653f319424f" providerId="ADAL" clId="{61DBC332-9CC0-465A-AB04-996F0238E80A}" dt="2021-11-01T20:10:55.111" v="914" actId="1076"/>
+          <ac:chgData name="Katie Johnston" userId="a8803450-7667-44c1-ac00-9653f319424f" providerId="ADAL" clId="{61DBC332-9CC0-465A-AB04-996F0238E80A}" dt="2021-11-01T20:59:00.670" v="1533" actId="1076"/>
           <ac:picMkLst>
             <pc:docMk/>
             <pc:sldMk cId="1488461104" sldId="263"/>
             <ac:picMk id="5" creationId="{726D4341-0088-4F88-9DA9-5F8BD5852973}"/>
           </ac:picMkLst>
         </pc:picChg>
-        <pc:picChg chg="add mod">
-          <ac:chgData name="Katie Johnston" userId="a8803450-7667-44c1-ac00-9653f319424f" providerId="ADAL" clId="{61DBC332-9CC0-465A-AB04-996F0238E80A}" dt="2021-11-01T20:10:11.190" v="909" actId="14100"/>
+        <pc:picChg chg="add del mod">
+          <ac:chgData name="Katie Johnston" userId="a8803450-7667-44c1-ac00-9653f319424f" providerId="ADAL" clId="{61DBC332-9CC0-465A-AB04-996F0238E80A}" dt="2021-11-01T20:54:16.206" v="1452" actId="21"/>
           <ac:picMkLst>
             <pc:docMk/>
             <pc:sldMk cId="1488461104" sldId="263"/>
@@ -566,6 +623,133 @@
             <pc:docMk/>
             <pc:sldMk cId="1488461104" sldId="263"/>
             <ac:picMk id="5126" creationId="{C49C8B9A-1DCB-483F-8118-D2EE67AAB884}"/>
+          </ac:picMkLst>
+        </pc:picChg>
+        <pc:picChg chg="add mod">
+          <ac:chgData name="Katie Johnston" userId="a8803450-7667-44c1-ac00-9653f319424f" providerId="ADAL" clId="{61DBC332-9CC0-465A-AB04-996F0238E80A}" dt="2021-11-01T20:29:02.082" v="1015" actId="1076"/>
+          <ac:picMkLst>
+            <pc:docMk/>
+            <pc:sldMk cId="1488461104" sldId="263"/>
+            <ac:picMk id="5128" creationId="{EC932A47-CE69-4DA8-A8FD-AC9946D2AEB5}"/>
+          </ac:picMkLst>
+        </pc:picChg>
+        <pc:picChg chg="add del mod">
+          <ac:chgData name="Katie Johnston" userId="a8803450-7667-44c1-ac00-9653f319424f" providerId="ADAL" clId="{61DBC332-9CC0-465A-AB04-996F0238E80A}" dt="2021-11-01T20:54:24.245" v="1456" actId="21"/>
+          <ac:picMkLst>
+            <pc:docMk/>
+            <pc:sldMk cId="1488461104" sldId="263"/>
+            <ac:picMk id="5130" creationId="{2D0777ED-827E-40C9-B236-4E74CA4BB200}"/>
+          </ac:picMkLst>
+        </pc:picChg>
+      </pc:sldChg>
+      <pc:sldChg chg="addSp delSp modSp new mod">
+        <pc:chgData name="Katie Johnston" userId="a8803450-7667-44c1-ac00-9653f319424f" providerId="ADAL" clId="{61DBC332-9CC0-465A-AB04-996F0238E80A}" dt="2021-11-01T20:58:30.337" v="1532" actId="20577"/>
+        <pc:sldMkLst>
+          <pc:docMk/>
+          <pc:sldMk cId="675019542" sldId="264"/>
+        </pc:sldMkLst>
+        <pc:spChg chg="add del">
+          <ac:chgData name="Katie Johnston" userId="a8803450-7667-44c1-ac00-9653f319424f" providerId="ADAL" clId="{61DBC332-9CC0-465A-AB04-996F0238E80A}" dt="2021-11-01T20:54:26.735" v="1457"/>
+          <ac:spMkLst>
+            <pc:docMk/>
+            <pc:sldMk cId="675019542" sldId="264"/>
+            <ac:spMk id="3" creationId="{2779BA6F-E2FF-49B1-B52A-36D25250DA89}"/>
+          </ac:spMkLst>
+        </pc:spChg>
+        <pc:spChg chg="add mod">
+          <ac:chgData name="Katie Johnston" userId="a8803450-7667-44c1-ac00-9653f319424f" providerId="ADAL" clId="{61DBC332-9CC0-465A-AB04-996F0238E80A}" dt="2021-11-01T20:57:45.457" v="1487" actId="20577"/>
+          <ac:spMkLst>
+            <pc:docMk/>
+            <pc:sldMk cId="675019542" sldId="264"/>
+            <ac:spMk id="7" creationId="{025A8012-6AF6-4DE7-A06B-F855422BA221}"/>
+          </ac:spMkLst>
+        </pc:spChg>
+        <pc:spChg chg="add mod">
+          <ac:chgData name="Katie Johnston" userId="a8803450-7667-44c1-ac00-9653f319424f" providerId="ADAL" clId="{61DBC332-9CC0-465A-AB04-996F0238E80A}" dt="2021-11-01T20:57:52.959" v="1497" actId="20577"/>
+          <ac:spMkLst>
+            <pc:docMk/>
+            <pc:sldMk cId="675019542" sldId="264"/>
+            <ac:spMk id="9" creationId="{857485BF-BC53-4CBF-B9B3-13C195EB3037}"/>
+          </ac:spMkLst>
+        </pc:spChg>
+        <pc:spChg chg="add mod">
+          <ac:chgData name="Katie Johnston" userId="a8803450-7667-44c1-ac00-9653f319424f" providerId="ADAL" clId="{61DBC332-9CC0-465A-AB04-996F0238E80A}" dt="2021-11-01T20:58:15.078" v="1515" actId="20577"/>
+          <ac:spMkLst>
+            <pc:docMk/>
+            <pc:sldMk cId="675019542" sldId="264"/>
+            <ac:spMk id="13" creationId="{1E551D5A-9CEA-4FA2-ABFF-A3662FBCB295}"/>
+          </ac:spMkLst>
+        </pc:spChg>
+        <pc:spChg chg="add mod">
+          <ac:chgData name="Katie Johnston" userId="a8803450-7667-44c1-ac00-9653f319424f" providerId="ADAL" clId="{61DBC332-9CC0-465A-AB04-996F0238E80A}" dt="2021-11-01T20:58:22.834" v="1526" actId="20577"/>
+          <ac:spMkLst>
+            <pc:docMk/>
+            <pc:sldMk cId="675019542" sldId="264"/>
+            <ac:spMk id="14" creationId="{D9B8A86F-407D-4CB1-9F02-8806F350AAE1}"/>
+          </ac:spMkLst>
+        </pc:spChg>
+        <pc:spChg chg="add mod">
+          <ac:chgData name="Katie Johnston" userId="a8803450-7667-44c1-ac00-9653f319424f" providerId="ADAL" clId="{61DBC332-9CC0-465A-AB04-996F0238E80A}" dt="2021-11-01T20:58:30.337" v="1532" actId="20577"/>
+          <ac:spMkLst>
+            <pc:docMk/>
+            <pc:sldMk cId="675019542" sldId="264"/>
+            <ac:spMk id="15" creationId="{FA357463-D3E5-4C2D-8609-AC4AD0104188}"/>
+          </ac:spMkLst>
+        </pc:spChg>
+        <pc:picChg chg="add del mod">
+          <ac:chgData name="Katie Johnston" userId="a8803450-7667-44c1-ac00-9653f319424f" providerId="ADAL" clId="{61DBC332-9CC0-465A-AB04-996F0238E80A}" dt="2021-11-01T20:54:14.816" v="1451"/>
+          <ac:picMkLst>
+            <pc:docMk/>
+            <pc:sldMk cId="675019542" sldId="264"/>
+            <ac:picMk id="4" creationId="{82F3546C-F716-4BAA-84A0-E64719B38165}"/>
+          </ac:picMkLst>
+        </pc:picChg>
+        <pc:picChg chg="add mod">
+          <ac:chgData name="Katie Johnston" userId="a8803450-7667-44c1-ac00-9653f319424f" providerId="ADAL" clId="{61DBC332-9CC0-465A-AB04-996F0238E80A}" dt="2021-11-01T20:54:22.086" v="1455" actId="1076"/>
+          <ac:picMkLst>
+            <pc:docMk/>
+            <pc:sldMk cId="675019542" sldId="264"/>
+            <ac:picMk id="5" creationId="{AC749BED-AD42-454F-BAAB-0E308D212175}"/>
+          </ac:picMkLst>
+        </pc:picChg>
+        <pc:picChg chg="add mod">
+          <ac:chgData name="Katie Johnston" userId="a8803450-7667-44c1-ac00-9653f319424f" providerId="ADAL" clId="{61DBC332-9CC0-465A-AB04-996F0238E80A}" dt="2021-11-01T20:55:57.175" v="1460" actId="1076"/>
+          <ac:picMkLst>
+            <pc:docMk/>
+            <pc:sldMk cId="675019542" sldId="264"/>
+            <ac:picMk id="6" creationId="{F3FF6AAA-4615-4AD8-8513-43940E7F4B66}"/>
+          </ac:picMkLst>
+        </pc:picChg>
+        <pc:picChg chg="add mod">
+          <ac:chgData name="Katie Johnston" userId="a8803450-7667-44c1-ac00-9653f319424f" providerId="ADAL" clId="{61DBC332-9CC0-465A-AB04-996F0238E80A}" dt="2021-11-01T20:56:05.742" v="1463" actId="1076"/>
+          <ac:picMkLst>
+            <pc:docMk/>
+            <pc:sldMk cId="675019542" sldId="264"/>
+            <ac:picMk id="8" creationId="{02C7BD92-8721-448E-BF0F-F7DE9AFBCAFC}"/>
+          </ac:picMkLst>
+        </pc:picChg>
+        <pc:picChg chg="add del mod">
+          <ac:chgData name="Katie Johnston" userId="a8803450-7667-44c1-ac00-9653f319424f" providerId="ADAL" clId="{61DBC332-9CC0-465A-AB04-996F0238E80A}" dt="2021-11-01T20:57:32.919" v="1469" actId="478"/>
+          <ac:picMkLst>
+            <pc:docMk/>
+            <pc:sldMk cId="675019542" sldId="264"/>
+            <ac:picMk id="6146" creationId="{D432ADCB-D5FA-4D30-B10A-226A2E459A35}"/>
+          </ac:picMkLst>
+        </pc:picChg>
+        <pc:picChg chg="add mod">
+          <ac:chgData name="Katie Johnston" userId="a8803450-7667-44c1-ac00-9653f319424f" providerId="ADAL" clId="{61DBC332-9CC0-465A-AB04-996F0238E80A}" dt="2021-11-01T20:56:36.086" v="1468" actId="1076"/>
+          <ac:picMkLst>
+            <pc:docMk/>
+            <pc:sldMk cId="675019542" sldId="264"/>
+            <ac:picMk id="6148" creationId="{7E8E879E-4979-4A26-B35D-188F42E0706F}"/>
+          </ac:picMkLst>
+        </pc:picChg>
+        <pc:picChg chg="add mod">
+          <ac:chgData name="Katie Johnston" userId="a8803450-7667-44c1-ac00-9653f319424f" providerId="ADAL" clId="{61DBC332-9CC0-465A-AB04-996F0238E80A}" dt="2021-11-01T20:57:35.366" v="1471" actId="1076"/>
+          <ac:picMkLst>
+            <pc:docMk/>
+            <pc:sldMk cId="675019542" sldId="264"/>
+            <ac:picMk id="6150" creationId="{0BFDAC03-9B22-402A-A115-8D3C8FD37F26}"/>
           </ac:picMkLst>
         </pc:picChg>
       </pc:sldChg>
@@ -4721,6 +4905,105 @@
           </a:p>
         </p:txBody>
       </p:sp>
+      <p:pic>
+        <p:nvPicPr>
+          <p:cNvPr id="18" name="Picture 13">
+            <a:extLst>
+              <a:ext uri="{FF2B5EF4-FFF2-40B4-BE49-F238E27FC236}">
+                <a16:creationId xmlns:a16="http://schemas.microsoft.com/office/drawing/2014/main" id="{BFC195A5-F42D-42F0-9E84-576DC1B49FEE}"/>
+              </a:ext>
+            </a:extLst>
+          </p:cNvPr>
+          <p:cNvPicPr>
+            <a:picLocks noChangeAspect="1" noChangeArrowheads="1"/>
+          </p:cNvPicPr>
+          <p:nvPr/>
+        </p:nvPicPr>
+        <p:blipFill>
+          <a:blip r:embed="rId7">
+            <a:extLst>
+              <a:ext uri="{28A0092B-C50C-407E-A947-70E740481C1C}">
+                <a14:useLocalDpi xmlns:a14="http://schemas.microsoft.com/office/drawing/2010/main" val="0"/>
+              </a:ext>
+            </a:extLst>
+          </a:blip>
+          <a:srcRect/>
+          <a:stretch>
+            <a:fillRect/>
+          </a:stretch>
+        </p:blipFill>
+        <p:spPr bwMode="auto">
+          <a:xfrm>
+            <a:off x="12319636" y="4802187"/>
+            <a:ext cx="2990850" cy="2514600"/>
+          </a:xfrm>
+          <a:prstGeom prst="rect">
+            <a:avLst/>
+          </a:prstGeom>
+          <a:noFill/>
+          <a:extLst>
+            <a:ext uri="{909E8E84-426E-40DD-AFC4-6F175D3DCCD1}">
+              <a14:hiddenFill xmlns:a14="http://schemas.microsoft.com/office/drawing/2010/main">
+                <a:solidFill>
+                  <a:srgbClr val="FFFFFF"/>
+                </a:solidFill>
+              </a14:hiddenFill>
+            </a:ext>
+          </a:extLst>
+        </p:spPr>
+      </p:pic>
+      <p:sp>
+        <p:nvSpPr>
+          <p:cNvPr id="13" name="Rectangle 12">
+            <a:extLst>
+              <a:ext uri="{FF2B5EF4-FFF2-40B4-BE49-F238E27FC236}">
+                <a16:creationId xmlns:a16="http://schemas.microsoft.com/office/drawing/2014/main" id="{EAB2BCC4-609B-4026-BB9B-082CC426E942}"/>
+              </a:ext>
+            </a:extLst>
+          </p:cNvPr>
+          <p:cNvSpPr/>
+          <p:nvPr/>
+        </p:nvSpPr>
+        <p:spPr>
+          <a:xfrm>
+            <a:off x="12876028" y="5283200"/>
+            <a:ext cx="287079" cy="256363"/>
+          </a:xfrm>
+          <a:prstGeom prst="rect">
+            <a:avLst/>
+          </a:prstGeom>
+          <a:noFill/>
+          <a:ln>
+            <a:solidFill>
+              <a:schemeClr val="tx1"/>
+            </a:solidFill>
+          </a:ln>
+        </p:spPr>
+        <p:style>
+          <a:lnRef idx="2">
+            <a:schemeClr val="accent1">
+              <a:shade val="50000"/>
+            </a:schemeClr>
+          </a:lnRef>
+          <a:fillRef idx="1">
+            <a:schemeClr val="accent1"/>
+          </a:fillRef>
+          <a:effectRef idx="0">
+            <a:schemeClr val="accent1"/>
+          </a:effectRef>
+          <a:fontRef idx="minor">
+            <a:schemeClr val="lt1"/>
+          </a:fontRef>
+        </p:style>
+        <p:txBody>
+          <a:bodyPr rtlCol="0" anchor="ctr"/>
+          <a:lstStyle/>
+          <a:p>
+            <a:pPr algn="ctr"/>
+            <a:endParaRPr lang="en-US"/>
+          </a:p>
+        </p:txBody>
+      </p:sp>
     </p:spTree>
     <p:extLst>
       <p:ext uri="{BB962C8B-B14F-4D97-AF65-F5344CB8AC3E}">
@@ -4897,7 +5180,7 @@
         </p:blipFill>
         <p:spPr>
           <a:xfrm>
-            <a:off x="6116320" y="3752215"/>
+            <a:off x="5404296" y="3752215"/>
             <a:ext cx="5572125" cy="2019300"/>
           </a:xfrm>
           <a:prstGeom prst="rect">
@@ -4983,6 +5266,197 @@
             <a:r>
               <a:rPr lang="en-US" dirty="0"/>
               <a:t>Picking up the 1 timescale</a:t>
+            </a:r>
+          </a:p>
+        </p:txBody>
+      </p:sp>
+      <p:pic>
+        <p:nvPicPr>
+          <p:cNvPr id="5128" name="Picture 8">
+            <a:extLst>
+              <a:ext uri="{FF2B5EF4-FFF2-40B4-BE49-F238E27FC236}">
+                <a16:creationId xmlns:a16="http://schemas.microsoft.com/office/drawing/2014/main" id="{EC932A47-CE69-4DA8-A8FD-AC9946D2AEB5}"/>
+              </a:ext>
+            </a:extLst>
+          </p:cNvPr>
+          <p:cNvPicPr>
+            <a:picLocks noChangeAspect="1" noChangeArrowheads="1"/>
+          </p:cNvPicPr>
+          <p:nvPr/>
+        </p:nvPicPr>
+        <p:blipFill>
+          <a:blip r:embed="rId6">
+            <a:extLst>
+              <a:ext uri="{28A0092B-C50C-407E-A947-70E740481C1C}">
+                <a14:useLocalDpi xmlns:a14="http://schemas.microsoft.com/office/drawing/2010/main" val="0"/>
+              </a:ext>
+            </a:extLst>
+          </a:blip>
+          <a:srcRect/>
+          <a:stretch>
+            <a:fillRect/>
+          </a:stretch>
+        </p:blipFill>
+        <p:spPr bwMode="auto">
+          <a:xfrm>
+            <a:off x="10094527" y="5364877"/>
+            <a:ext cx="1763788" cy="1338779"/>
+          </a:xfrm>
+          <a:prstGeom prst="rect">
+            <a:avLst/>
+          </a:prstGeom>
+          <a:noFill/>
+          <a:extLst>
+            <a:ext uri="{909E8E84-426E-40DD-AFC4-6F175D3DCCD1}">
+              <a14:hiddenFill xmlns:a14="http://schemas.microsoft.com/office/drawing/2010/main">
+                <a:solidFill>
+                  <a:srgbClr val="FFFFFF"/>
+                </a:solidFill>
+              </a14:hiddenFill>
+            </a:ext>
+          </a:extLst>
+        </p:spPr>
+      </p:pic>
+      <p:sp>
+        <p:nvSpPr>
+          <p:cNvPr id="7" name="TextBox 6">
+            <a:extLst>
+              <a:ext uri="{FF2B5EF4-FFF2-40B4-BE49-F238E27FC236}">
+                <a16:creationId xmlns:a16="http://schemas.microsoft.com/office/drawing/2014/main" id="{51855901-06C8-467A-8E7C-573C45A697A6}"/>
+              </a:ext>
+            </a:extLst>
+          </p:cNvPr>
+          <p:cNvSpPr txBox="1"/>
+          <p:nvPr/>
+        </p:nvSpPr>
+        <p:spPr>
+          <a:xfrm>
+            <a:off x="12439650" y="1690688"/>
+            <a:ext cx="6965753" cy="2308324"/>
+          </a:xfrm>
+          <a:prstGeom prst="rect">
+            <a:avLst/>
+          </a:prstGeom>
+          <a:noFill/>
+        </p:spPr>
+        <p:txBody>
+          <a:bodyPr wrap="none" rtlCol="0">
+            <a:spAutoFit/>
+          </a:bodyPr>
+          <a:lstStyle/>
+          <a:p>
+            <a:pPr marL="285750" indent="-285750">
+              <a:buFont typeface="Arial" panose="020B0604020202020204" pitchFamily="34" charset="0"/>
+              <a:buChar char="•"/>
+            </a:pPr>
+            <a:r>
+              <a:rPr lang="en-US" dirty="0"/>
+              <a:t>Get space model at 2x2</a:t>
+            </a:r>
+          </a:p>
+          <a:p>
+            <a:pPr marL="285750" indent="-285750">
+              <a:buFont typeface="Arial" panose="020B0604020202020204" pitchFamily="34" charset="0"/>
+              <a:buChar char="•"/>
+            </a:pPr>
+            <a:r>
+              <a:rPr lang="en-US" dirty="0"/>
+              <a:t>Train in smallest time scale.</a:t>
+            </a:r>
+          </a:p>
+          <a:p>
+            <a:pPr marL="285750" indent="-285750">
+              <a:buFont typeface="Arial" panose="020B0604020202020204" pitchFamily="34" charset="0"/>
+              <a:buChar char="•"/>
+            </a:pPr>
+            <a:r>
+              <a:rPr lang="en-US" dirty="0"/>
+              <a:t>Find error and save</a:t>
+            </a:r>
+          </a:p>
+          <a:p>
+            <a:pPr marL="285750" indent="-285750">
+              <a:buFont typeface="Arial" panose="020B0604020202020204" pitchFamily="34" charset="0"/>
+              <a:buChar char="•"/>
+            </a:pPr>
+            <a:r>
+              <a:rPr lang="en-US" dirty="0"/>
+              <a:t>Keep making step size bigger until error increases</a:t>
+            </a:r>
+          </a:p>
+          <a:p>
+            <a:pPr marL="285750" indent="-285750">
+              <a:buFont typeface="Arial" panose="020B0604020202020204" pitchFamily="34" charset="0"/>
+              <a:buChar char="•"/>
+            </a:pPr>
+            <a:r>
+              <a:rPr lang="en-US" dirty="0"/>
+              <a:t>Refine space and repeat on areas as needed</a:t>
+            </a:r>
+          </a:p>
+          <a:p>
+            <a:pPr marL="742950" lvl="1" indent="-285750">
+              <a:buFont typeface="Arial" panose="020B0604020202020204" pitchFamily="34" charset="0"/>
+              <a:buChar char="•"/>
+            </a:pPr>
+            <a:r>
+              <a:rPr lang="en-US" dirty="0"/>
+              <a:t>Start with timestep of previous and see if next timestep is better</a:t>
+            </a:r>
+          </a:p>
+          <a:p>
+            <a:pPr marL="742950" lvl="1" indent="-285750">
+              <a:buFont typeface="Arial" panose="020B0604020202020204" pitchFamily="34" charset="0"/>
+              <a:buChar char="•"/>
+            </a:pPr>
+            <a:r>
+              <a:rPr lang="en-US" dirty="0"/>
+              <a:t>If yes, check next. If no, stay at timestep</a:t>
+            </a:r>
+          </a:p>
+          <a:p>
+            <a:pPr marL="742950" lvl="1" indent="-285750">
+              <a:buFont typeface="Arial" panose="020B0604020202020204" pitchFamily="34" charset="0"/>
+              <a:buChar char="•"/>
+            </a:pPr>
+            <a:r>
+              <a:rPr lang="en-US" dirty="0"/>
+              <a:t>This assumes scale get smaller</a:t>
+            </a:r>
+          </a:p>
+        </p:txBody>
+      </p:sp>
+      <p:sp>
+        <p:nvSpPr>
+          <p:cNvPr id="14" name="TextBox 13">
+            <a:extLst>
+              <a:ext uri="{FF2B5EF4-FFF2-40B4-BE49-F238E27FC236}">
+                <a16:creationId xmlns:a16="http://schemas.microsoft.com/office/drawing/2014/main" id="{CFA8F2F7-B5A9-424F-ACBC-EC396ACC862F}"/>
+              </a:ext>
+            </a:extLst>
+          </p:cNvPr>
+          <p:cNvSpPr txBox="1"/>
+          <p:nvPr/>
+        </p:nvSpPr>
+        <p:spPr>
+          <a:xfrm>
+            <a:off x="12618651" y="4764712"/>
+            <a:ext cx="3048001" cy="1200329"/>
+          </a:xfrm>
+          <a:prstGeom prst="rect">
+            <a:avLst/>
+          </a:prstGeom>
+          <a:noFill/>
+        </p:spPr>
+        <p:txBody>
+          <a:bodyPr wrap="square" rtlCol="0">
+            <a:spAutoFit/>
+          </a:bodyPr>
+          <a:lstStyle/>
+          <a:p>
+            <a:r>
+              <a:rPr lang="en-US" dirty="0"/>
+              <a:t>When refining the model, should I make any assumptions about blocks being the same next work?</a:t>
             </a:r>
           </a:p>
         </p:txBody>
@@ -5022,7 +5496,7 @@
           <p:cNvPr id="2" name="Title 1">
             <a:extLst>
               <a:ext uri="{FF2B5EF4-FFF2-40B4-BE49-F238E27FC236}">
-                <a16:creationId xmlns:a16="http://schemas.microsoft.com/office/drawing/2014/main" id="{7527406E-331B-4DE3-8D46-311B68A51AF7}"/>
+                <a16:creationId xmlns:a16="http://schemas.microsoft.com/office/drawing/2014/main" id="{835912B2-23FC-4C0A-BDC0-B3022E6F0B8E}"/>
               </a:ext>
             </a:extLst>
           </p:cNvPr>
@@ -5038,24 +5512,16 @@
           <a:bodyPr/>
           <a:lstStyle/>
           <a:p>
-            <a:r>
-              <a:rPr lang="en-US" dirty="0"/>
-              <a:t>Toy2 through the </a:t>
-            </a:r>
-            <a:r>
-              <a:rPr lang="en-US" dirty="0" err="1"/>
-              <a:t>cnn</a:t>
-            </a:r>
-            <a:endParaRPr lang="en-US" dirty="0"/>
+            <a:endParaRPr lang="en-US"/>
           </a:p>
         </p:txBody>
       </p:sp>
       <p:pic>
         <p:nvPicPr>
-          <p:cNvPr id="4098" name="Picture 2">
-            <a:extLst>
-              <a:ext uri="{FF2B5EF4-FFF2-40B4-BE49-F238E27FC236}">
-                <a16:creationId xmlns:a16="http://schemas.microsoft.com/office/drawing/2014/main" id="{68382DCD-C730-4AA1-9444-D09C0C52A47A}"/>
+          <p:cNvPr id="5" name="Picture 2">
+            <a:extLst>
+              <a:ext uri="{FF2B5EF4-FFF2-40B4-BE49-F238E27FC236}">
+                <a16:creationId xmlns:a16="http://schemas.microsoft.com/office/drawing/2014/main" id="{AC749BED-AD42-454F-BAAB-0E308D212175}"/>
               </a:ext>
             </a:extLst>
           </p:cNvPr>
@@ -5079,8 +5545,8 @@
         </p:blipFill>
         <p:spPr bwMode="auto">
           <a:xfrm>
-            <a:off x="838200" y="1871980"/>
-            <a:ext cx="2876550" cy="2362200"/>
+            <a:off x="838200" y="728383"/>
+            <a:ext cx="4050926" cy="2700617"/>
           </a:xfrm>
           <a:prstGeom prst="rect">
             <a:avLst/>
@@ -5099,17 +5565,19 @@
       </p:pic>
       <p:pic>
         <p:nvPicPr>
-          <p:cNvPr id="4100" name="Picture 4">
-            <a:extLst>
-              <a:ext uri="{FF2B5EF4-FFF2-40B4-BE49-F238E27FC236}">
-                <a16:creationId xmlns:a16="http://schemas.microsoft.com/office/drawing/2014/main" id="{9BD65EE8-F7AF-409B-B496-1673CCF043B8}"/>
+          <p:cNvPr id="6" name="Picture 10">
+            <a:extLst>
+              <a:ext uri="{FF2B5EF4-FFF2-40B4-BE49-F238E27FC236}">
+                <a16:creationId xmlns:a16="http://schemas.microsoft.com/office/drawing/2014/main" id="{F3FF6AAA-4615-4AD8-8513-43940E7F4B66}"/>
               </a:ext>
             </a:extLst>
           </p:cNvPr>
           <p:cNvPicPr>
-            <a:picLocks noChangeAspect="1" noChangeArrowheads="1"/>
+            <a:picLocks noGrp="1" noChangeAspect="1" noChangeArrowheads="1"/>
           </p:cNvPicPr>
-          <p:nvPr/>
+          <p:nvPr>
+            <p:ph idx="1"/>
+          </p:nvPr>
         </p:nvPicPr>
         <p:blipFill>
           <a:blip r:embed="rId3">
@@ -5126,8 +5594,8 @@
         </p:blipFill>
         <p:spPr bwMode="auto">
           <a:xfrm>
-            <a:off x="4572000" y="1871980"/>
-            <a:ext cx="3048000" cy="2400300"/>
+            <a:off x="5543210" y="563265"/>
+            <a:ext cx="4723809" cy="3149206"/>
           </a:xfrm>
           <a:prstGeom prst="rect">
             <a:avLst/>
@@ -5144,115 +5612,318 @@
           </a:extLst>
         </p:spPr>
       </p:pic>
-      <p:sp>
-        <p:nvSpPr>
-          <p:cNvPr id="4" name="TextBox 3">
-            <a:extLst>
-              <a:ext uri="{FF2B5EF4-FFF2-40B4-BE49-F238E27FC236}">
-                <a16:creationId xmlns:a16="http://schemas.microsoft.com/office/drawing/2014/main" id="{BC1ABE50-CE5F-49B0-A766-C33DCCDD0E40}"/>
-              </a:ext>
-            </a:extLst>
-          </p:cNvPr>
-          <p:cNvSpPr txBox="1"/>
+      <p:pic>
+        <p:nvPicPr>
+          <p:cNvPr id="8" name="Picture 6">
+            <a:extLst>
+              <a:ext uri="{FF2B5EF4-FFF2-40B4-BE49-F238E27FC236}">
+                <a16:creationId xmlns:a16="http://schemas.microsoft.com/office/drawing/2014/main" id="{02C7BD92-8721-448E-BF0F-F7DE9AFBCAFC}"/>
+              </a:ext>
+            </a:extLst>
+          </p:cNvPr>
+          <p:cNvPicPr>
+            <a:picLocks noChangeAspect="1" noChangeArrowheads="1"/>
+          </p:cNvPicPr>
           <p:nvPr/>
-        </p:nvSpPr>
-        <p:spPr>
-          <a:xfrm>
-            <a:off x="1046480" y="4230806"/>
-            <a:ext cx="2878032" cy="369332"/>
+        </p:nvPicPr>
+        <p:blipFill>
+          <a:blip r:embed="rId4">
+            <a:extLst>
+              <a:ext uri="{28A0092B-C50C-407E-A947-70E740481C1C}">
+                <a14:useLocalDpi xmlns:a14="http://schemas.microsoft.com/office/drawing/2010/main" val="0"/>
+              </a:ext>
+            </a:extLst>
+          </a:blip>
+          <a:srcRect/>
+          <a:stretch>
+            <a:fillRect/>
+          </a:stretch>
+        </p:blipFill>
+        <p:spPr bwMode="auto">
+          <a:xfrm>
+            <a:off x="439420" y="3712471"/>
+            <a:ext cx="3543300" cy="2362200"/>
           </a:xfrm>
           <a:prstGeom prst="rect">
             <a:avLst/>
           </a:prstGeom>
           <a:noFill/>
-        </p:spPr>
-        <p:txBody>
-          <a:bodyPr wrap="none" rtlCol="0">
-            <a:spAutoFit/>
-          </a:bodyPr>
-          <a:lstStyle/>
-          <a:p>
-            <a:r>
-              <a:rPr lang="en-US" dirty="0"/>
-              <a:t>Autoencoder (final decoded)</a:t>
-            </a:r>
-          </a:p>
-        </p:txBody>
-      </p:sp>
-      <p:sp>
-        <p:nvSpPr>
-          <p:cNvPr id="5" name="TextBox 4">
-            <a:extLst>
-              <a:ext uri="{FF2B5EF4-FFF2-40B4-BE49-F238E27FC236}">
-                <a16:creationId xmlns:a16="http://schemas.microsoft.com/office/drawing/2014/main" id="{30DC4815-1F4A-4D42-8D5A-096FE2B91459}"/>
-              </a:ext>
-            </a:extLst>
-          </p:cNvPr>
-          <p:cNvSpPr txBox="1"/>
+          <a:extLst>
+            <a:ext uri="{909E8E84-426E-40DD-AFC4-6F175D3DCCD1}">
+              <a14:hiddenFill xmlns:a14="http://schemas.microsoft.com/office/drawing/2010/main">
+                <a:solidFill>
+                  <a:srgbClr val="FFFFFF"/>
+                </a:solidFill>
+              </a14:hiddenFill>
+            </a:ext>
+          </a:extLst>
+        </p:spPr>
+      </p:pic>
+      <p:pic>
+        <p:nvPicPr>
+          <p:cNvPr id="6148" name="Picture 4">
+            <a:extLst>
+              <a:ext uri="{FF2B5EF4-FFF2-40B4-BE49-F238E27FC236}">
+                <a16:creationId xmlns:a16="http://schemas.microsoft.com/office/drawing/2014/main" id="{7E8E879E-4979-4A26-B35D-188F42E0706F}"/>
+              </a:ext>
+            </a:extLst>
+          </p:cNvPr>
+          <p:cNvPicPr>
+            <a:picLocks noChangeAspect="1" noChangeArrowheads="1"/>
+          </p:cNvPicPr>
           <p:nvPr/>
-        </p:nvSpPr>
-        <p:spPr>
-          <a:xfrm>
-            <a:off x="5354320" y="3291840"/>
-            <a:ext cx="998671" cy="369332"/>
+        </p:nvPicPr>
+        <p:blipFill>
+          <a:blip r:embed="rId5">
+            <a:extLst>
+              <a:ext uri="{28A0092B-C50C-407E-A947-70E740481C1C}">
+                <a14:useLocalDpi xmlns:a14="http://schemas.microsoft.com/office/drawing/2010/main" val="0"/>
+              </a:ext>
+            </a:extLst>
+          </a:blip>
+          <a:srcRect/>
+          <a:stretch>
+            <a:fillRect/>
+          </a:stretch>
+        </p:blipFill>
+        <p:spPr bwMode="auto">
+          <a:xfrm>
+            <a:off x="8109584" y="3787140"/>
+            <a:ext cx="3543300" cy="2362200"/>
           </a:xfrm>
           <a:prstGeom prst="rect">
             <a:avLst/>
           </a:prstGeom>
           <a:noFill/>
-        </p:spPr>
-        <p:txBody>
-          <a:bodyPr wrap="none" rtlCol="0">
-            <a:spAutoFit/>
-          </a:bodyPr>
-          <a:lstStyle/>
-          <a:p>
-            <a:r>
-              <a:rPr lang="en-US" dirty="0"/>
-              <a:t>encoded</a:t>
-            </a:r>
-          </a:p>
-        </p:txBody>
-      </p:sp>
-      <p:sp>
-        <p:nvSpPr>
-          <p:cNvPr id="6" name="TextBox 5">
-            <a:extLst>
-              <a:ext uri="{FF2B5EF4-FFF2-40B4-BE49-F238E27FC236}">
-                <a16:creationId xmlns:a16="http://schemas.microsoft.com/office/drawing/2014/main" id="{67BA2447-38B6-4221-871A-314CFBA6D88A}"/>
-              </a:ext>
-            </a:extLst>
-          </p:cNvPr>
-          <p:cNvSpPr txBox="1"/>
+          <a:extLst>
+            <a:ext uri="{909E8E84-426E-40DD-AFC4-6F175D3DCCD1}">
+              <a14:hiddenFill xmlns:a14="http://schemas.microsoft.com/office/drawing/2010/main">
+                <a:solidFill>
+                  <a:srgbClr val="FFFFFF"/>
+                </a:solidFill>
+              </a14:hiddenFill>
+            </a:ext>
+          </a:extLst>
+        </p:spPr>
+      </p:pic>
+      <p:pic>
+        <p:nvPicPr>
+          <p:cNvPr id="6150" name="Picture 6">
+            <a:extLst>
+              <a:ext uri="{FF2B5EF4-FFF2-40B4-BE49-F238E27FC236}">
+                <a16:creationId xmlns:a16="http://schemas.microsoft.com/office/drawing/2014/main" id="{0BFDAC03-9B22-402A-A115-8D3C8FD37F26}"/>
+              </a:ext>
+            </a:extLst>
+          </p:cNvPr>
+          <p:cNvPicPr>
+            <a:picLocks noChangeAspect="1" noChangeArrowheads="1"/>
+          </p:cNvPicPr>
           <p:nvPr/>
-        </p:nvSpPr>
-        <p:spPr>
-          <a:xfrm>
-            <a:off x="9133840" y="1544320"/>
-            <a:ext cx="2570480" cy="1200329"/>
+        </p:nvPicPr>
+        <p:blipFill>
+          <a:blip r:embed="rId6">
+            <a:extLst>
+              <a:ext uri="{28A0092B-C50C-407E-A947-70E740481C1C}">
+                <a14:useLocalDpi xmlns:a14="http://schemas.microsoft.com/office/drawing/2010/main" val="0"/>
+              </a:ext>
+            </a:extLst>
+          </a:blip>
+          <a:srcRect/>
+          <a:stretch>
+            <a:fillRect/>
+          </a:stretch>
+        </p:blipFill>
+        <p:spPr bwMode="auto">
+          <a:xfrm>
+            <a:off x="4274502" y="3767417"/>
+            <a:ext cx="3543300" cy="2362200"/>
           </a:xfrm>
           <a:prstGeom prst="rect">
             <a:avLst/>
           </a:prstGeom>
           <a:noFill/>
-        </p:spPr>
-        <p:txBody>
-          <a:bodyPr wrap="square" rtlCol="0">
+          <a:extLst>
+            <a:ext uri="{909E8E84-426E-40DD-AFC4-6F175D3DCCD1}">
+              <a14:hiddenFill xmlns:a14="http://schemas.microsoft.com/office/drawing/2010/main">
+                <a:solidFill>
+                  <a:srgbClr val="FFFFFF"/>
+                </a:solidFill>
+              </a14:hiddenFill>
+            </a:ext>
+          </a:extLst>
+        </p:spPr>
+      </p:pic>
+      <p:sp>
+        <p:nvSpPr>
+          <p:cNvPr id="7" name="TextBox 6">
+            <a:extLst>
+              <a:ext uri="{FF2B5EF4-FFF2-40B4-BE49-F238E27FC236}">
+                <a16:creationId xmlns:a16="http://schemas.microsoft.com/office/drawing/2014/main" id="{025A8012-6AF6-4DE7-A06B-F855422BA221}"/>
+              </a:ext>
+            </a:extLst>
+          </p:cNvPr>
+          <p:cNvSpPr txBox="1"/>
+          <p:nvPr/>
+        </p:nvSpPr>
+        <p:spPr>
+          <a:xfrm>
+            <a:off x="1534160" y="1027906"/>
+            <a:ext cx="1469569" cy="369332"/>
+          </a:xfrm>
+          <a:prstGeom prst="rect">
+            <a:avLst/>
+          </a:prstGeom>
+          <a:noFill/>
+        </p:spPr>
+        <p:txBody>
+          <a:bodyPr wrap="none" rtlCol="0">
             <a:spAutoFit/>
           </a:bodyPr>
           <a:lstStyle/>
           <a:p>
             <a:r>
               <a:rPr lang="en-US" dirty="0"/>
-              <a:t>Based on our structure of the </a:t>
-            </a:r>
-            <a:r>
-              <a:rPr lang="en-US" dirty="0" err="1"/>
-              <a:t>cnn</a:t>
-            </a:r>
+              <a:t>2x2 predicted</a:t>
+            </a:r>
+          </a:p>
+        </p:txBody>
+      </p:sp>
+      <p:sp>
+        <p:nvSpPr>
+          <p:cNvPr id="9" name="TextBox 8">
+            <a:extLst>
+              <a:ext uri="{FF2B5EF4-FFF2-40B4-BE49-F238E27FC236}">
+                <a16:creationId xmlns:a16="http://schemas.microsoft.com/office/drawing/2014/main" id="{857485BF-BC53-4CBF-B9B3-13C195EB3037}"/>
+              </a:ext>
+            </a:extLst>
+          </p:cNvPr>
+          <p:cNvSpPr txBox="1"/>
+          <p:nvPr/>
+        </p:nvSpPr>
+        <p:spPr>
+          <a:xfrm>
+            <a:off x="7711440" y="985241"/>
+            <a:ext cx="1048685" cy="369332"/>
+          </a:xfrm>
+          <a:prstGeom prst="rect">
+            <a:avLst/>
+          </a:prstGeom>
+          <a:noFill/>
+        </p:spPr>
+        <p:txBody>
+          <a:bodyPr wrap="none" rtlCol="0">
+            <a:spAutoFit/>
+          </a:bodyPr>
+          <a:lstStyle/>
+          <a:p>
             <a:r>
               <a:rPr lang="en-US" dirty="0"/>
-              <a:t>, we need data 2^n – 1 (original data 127x127, smallest is 3x3)</a:t>
+              <a:t>2x2 truth</a:t>
+            </a:r>
+          </a:p>
+        </p:txBody>
+      </p:sp>
+      <p:sp>
+        <p:nvSpPr>
+          <p:cNvPr id="13" name="TextBox 12">
+            <a:extLst>
+              <a:ext uri="{FF2B5EF4-FFF2-40B4-BE49-F238E27FC236}">
+                <a16:creationId xmlns:a16="http://schemas.microsoft.com/office/drawing/2014/main" id="{1E551D5A-9CEA-4FA2-ABFF-A3662FBCB295}"/>
+              </a:ext>
+            </a:extLst>
+          </p:cNvPr>
+          <p:cNvSpPr txBox="1"/>
+          <p:nvPr/>
+        </p:nvSpPr>
+        <p:spPr>
+          <a:xfrm>
+            <a:off x="1394094" y="4106386"/>
+            <a:ext cx="1703608" cy="369332"/>
+          </a:xfrm>
+          <a:prstGeom prst="rect">
+            <a:avLst/>
+          </a:prstGeom>
+          <a:noFill/>
+        </p:spPr>
+        <p:txBody>
+          <a:bodyPr wrap="none" rtlCol="0">
+            <a:spAutoFit/>
+          </a:bodyPr>
+          <a:lstStyle/>
+          <a:p>
+            <a:r>
+              <a:rPr lang="en-US" dirty="0"/>
+              <a:t>16x16 predicted</a:t>
+            </a:r>
+          </a:p>
+        </p:txBody>
+      </p:sp>
+      <p:sp>
+        <p:nvSpPr>
+          <p:cNvPr id="14" name="TextBox 13">
+            <a:extLst>
+              <a:ext uri="{FF2B5EF4-FFF2-40B4-BE49-F238E27FC236}">
+                <a16:creationId xmlns:a16="http://schemas.microsoft.com/office/drawing/2014/main" id="{D9B8A86F-407D-4CB1-9F02-8806F350AAE1}"/>
+              </a:ext>
+            </a:extLst>
+          </p:cNvPr>
+          <p:cNvSpPr txBox="1"/>
+          <p:nvPr/>
+        </p:nvSpPr>
+        <p:spPr>
+          <a:xfrm>
+            <a:off x="4889126" y="4291052"/>
+            <a:ext cx="1729320" cy="369332"/>
+          </a:xfrm>
+          <a:prstGeom prst="rect">
+            <a:avLst/>
+          </a:prstGeom>
+          <a:noFill/>
+        </p:spPr>
+        <p:txBody>
+          <a:bodyPr wrap="none" rtlCol="0">
+            <a:spAutoFit/>
+          </a:bodyPr>
+          <a:lstStyle/>
+          <a:p>
+            <a:r>
+              <a:rPr lang="en-US" dirty="0"/>
+              <a:t>16x16 fast  truth</a:t>
+            </a:r>
+          </a:p>
+        </p:txBody>
+      </p:sp>
+      <p:sp>
+        <p:nvSpPr>
+          <p:cNvPr id="15" name="TextBox 14">
+            <a:extLst>
+              <a:ext uri="{FF2B5EF4-FFF2-40B4-BE49-F238E27FC236}">
+                <a16:creationId xmlns:a16="http://schemas.microsoft.com/office/drawing/2014/main" id="{FA357463-D3E5-4C2D-8609-AC4AD0104188}"/>
+              </a:ext>
+            </a:extLst>
+          </p:cNvPr>
+          <p:cNvSpPr txBox="1"/>
+          <p:nvPr/>
+        </p:nvSpPr>
+        <p:spPr>
+          <a:xfrm>
+            <a:off x="8353686" y="4200725"/>
+            <a:ext cx="1817229" cy="369332"/>
+          </a:xfrm>
+          <a:prstGeom prst="rect">
+            <a:avLst/>
+          </a:prstGeom>
+          <a:noFill/>
+        </p:spPr>
+        <p:txBody>
+          <a:bodyPr wrap="none" rtlCol="0">
+            <a:spAutoFit/>
+          </a:bodyPr>
+          <a:lstStyle/>
+          <a:p>
+            <a:r>
+              <a:rPr lang="en-US" dirty="0"/>
+              <a:t>16x16 slow  truth</a:t>
             </a:r>
           </a:p>
         </p:txBody>
@@ -5260,7 +5931,7 @@
     </p:spTree>
     <p:extLst>
       <p:ext uri="{BB962C8B-B14F-4D97-AF65-F5344CB8AC3E}">
-        <p14:creationId xmlns:p14="http://schemas.microsoft.com/office/powerpoint/2010/main" val="3079746576"/>
+        <p14:creationId xmlns:p14="http://schemas.microsoft.com/office/powerpoint/2010/main" val="675019542"/>
       </p:ext>
     </p:extLst>
   </p:cSld>
@@ -5287,12 +5958,45 @@
           <a:chExt cx="0" cy="0"/>
         </a:xfrm>
       </p:grpSpPr>
+      <p:sp>
+        <p:nvSpPr>
+          <p:cNvPr id="2" name="Title 1">
+            <a:extLst>
+              <a:ext uri="{FF2B5EF4-FFF2-40B4-BE49-F238E27FC236}">
+                <a16:creationId xmlns:a16="http://schemas.microsoft.com/office/drawing/2014/main" id="{7527406E-331B-4DE3-8D46-311B68A51AF7}"/>
+              </a:ext>
+            </a:extLst>
+          </p:cNvPr>
+          <p:cNvSpPr>
+            <a:spLocks noGrp="1"/>
+          </p:cNvSpPr>
+          <p:nvPr>
+            <p:ph type="title"/>
+          </p:nvPr>
+        </p:nvSpPr>
+        <p:spPr/>
+        <p:txBody>
+          <a:bodyPr/>
+          <a:lstStyle/>
+          <a:p>
+            <a:r>
+              <a:rPr lang="en-US" dirty="0"/>
+              <a:t>Toy2 through the </a:t>
+            </a:r>
+            <a:r>
+              <a:rPr lang="en-US" dirty="0" err="1"/>
+              <a:t>cnn</a:t>
+            </a:r>
+            <a:endParaRPr lang="en-US" dirty="0"/>
+          </a:p>
+        </p:txBody>
+      </p:sp>
       <p:pic>
         <p:nvPicPr>
-          <p:cNvPr id="1026" name="Picture 2">
-            <a:extLst>
-              <a:ext uri="{FF2B5EF4-FFF2-40B4-BE49-F238E27FC236}">
-                <a16:creationId xmlns:a16="http://schemas.microsoft.com/office/drawing/2014/main" id="{D271FE50-61CE-4F9E-9434-DF7286857300}"/>
+          <p:cNvPr id="4098" name="Picture 2">
+            <a:extLst>
+              <a:ext uri="{FF2B5EF4-FFF2-40B4-BE49-F238E27FC236}">
+                <a16:creationId xmlns:a16="http://schemas.microsoft.com/office/drawing/2014/main" id="{68382DCD-C730-4AA1-9444-D09C0C52A47A}"/>
               </a:ext>
             </a:extLst>
           </p:cNvPr>
@@ -5316,8 +6020,8 @@
         </p:blipFill>
         <p:spPr bwMode="auto">
           <a:xfrm>
-            <a:off x="304800" y="209550"/>
-            <a:ext cx="2990850" cy="2514600"/>
+            <a:off x="838200" y="1871980"/>
+            <a:ext cx="2876550" cy="2362200"/>
           </a:xfrm>
           <a:prstGeom prst="rect">
             <a:avLst/>
@@ -5336,10 +6040,10 @@
       </p:pic>
       <p:pic>
         <p:nvPicPr>
-          <p:cNvPr id="1028" name="Picture 4">
-            <a:extLst>
-              <a:ext uri="{FF2B5EF4-FFF2-40B4-BE49-F238E27FC236}">
-                <a16:creationId xmlns:a16="http://schemas.microsoft.com/office/drawing/2014/main" id="{1D4F1EF1-2482-418F-9050-4BED1092A09C}"/>
+          <p:cNvPr id="4100" name="Picture 4">
+            <a:extLst>
+              <a:ext uri="{FF2B5EF4-FFF2-40B4-BE49-F238E27FC236}">
+                <a16:creationId xmlns:a16="http://schemas.microsoft.com/office/drawing/2014/main" id="{9BD65EE8-F7AF-409B-B496-1673CCF043B8}"/>
               </a:ext>
             </a:extLst>
           </p:cNvPr>
@@ -5363,8 +6067,8 @@
         </p:blipFill>
         <p:spPr bwMode="auto">
           <a:xfrm>
-            <a:off x="3390900" y="209550"/>
-            <a:ext cx="3162300" cy="2514600"/>
+            <a:off x="4572000" y="1871980"/>
+            <a:ext cx="3048000" cy="2400300"/>
           </a:xfrm>
           <a:prstGeom prst="rect">
             <a:avLst/>
@@ -5381,151 +6085,123 @@
           </a:extLst>
         </p:spPr>
       </p:pic>
-      <p:pic>
-        <p:nvPicPr>
-          <p:cNvPr id="1030" name="Picture 6">
-            <a:extLst>
-              <a:ext uri="{FF2B5EF4-FFF2-40B4-BE49-F238E27FC236}">
-                <a16:creationId xmlns:a16="http://schemas.microsoft.com/office/drawing/2014/main" id="{57060197-1CD2-4299-ACAC-53DC2784B539}"/>
-              </a:ext>
-            </a:extLst>
-          </p:cNvPr>
-          <p:cNvPicPr>
-            <a:picLocks noChangeAspect="1" noChangeArrowheads="1"/>
-          </p:cNvPicPr>
+      <p:sp>
+        <p:nvSpPr>
+          <p:cNvPr id="4" name="TextBox 3">
+            <a:extLst>
+              <a:ext uri="{FF2B5EF4-FFF2-40B4-BE49-F238E27FC236}">
+                <a16:creationId xmlns:a16="http://schemas.microsoft.com/office/drawing/2014/main" id="{BC1ABE50-CE5F-49B0-A766-C33DCCDD0E40}"/>
+              </a:ext>
+            </a:extLst>
+          </p:cNvPr>
+          <p:cNvSpPr txBox="1"/>
           <p:nvPr/>
-        </p:nvPicPr>
-        <p:blipFill>
-          <a:blip r:embed="rId4">
-            <a:extLst>
-              <a:ext uri="{28A0092B-C50C-407E-A947-70E740481C1C}">
-                <a14:useLocalDpi xmlns:a14="http://schemas.microsoft.com/office/drawing/2010/main" val="0"/>
-              </a:ext>
-            </a:extLst>
-          </a:blip>
-          <a:srcRect/>
-          <a:stretch>
-            <a:fillRect/>
-          </a:stretch>
-        </p:blipFill>
-        <p:spPr bwMode="auto">
-          <a:xfrm>
-            <a:off x="6646545" y="433070"/>
-            <a:ext cx="3105150" cy="2514600"/>
+        </p:nvSpPr>
+        <p:spPr>
+          <a:xfrm>
+            <a:off x="1046480" y="4230806"/>
+            <a:ext cx="2878032" cy="369332"/>
           </a:xfrm>
           <a:prstGeom prst="rect">
             <a:avLst/>
           </a:prstGeom>
           <a:noFill/>
-          <a:extLst>
-            <a:ext uri="{909E8E84-426E-40DD-AFC4-6F175D3DCCD1}">
-              <a14:hiddenFill xmlns:a14="http://schemas.microsoft.com/office/drawing/2010/main">
-                <a:solidFill>
-                  <a:srgbClr val="FFFFFF"/>
-                </a:solidFill>
-              </a14:hiddenFill>
-            </a:ext>
-          </a:extLst>
-        </p:spPr>
-      </p:pic>
-      <p:pic>
-        <p:nvPicPr>
-          <p:cNvPr id="1032" name="Picture 8">
-            <a:extLst>
-              <a:ext uri="{FF2B5EF4-FFF2-40B4-BE49-F238E27FC236}">
-                <a16:creationId xmlns:a16="http://schemas.microsoft.com/office/drawing/2014/main" id="{478772BB-401C-4AA2-968B-DCD8A9FE90B7}"/>
-              </a:ext>
-            </a:extLst>
-          </p:cNvPr>
-          <p:cNvPicPr>
-            <a:picLocks noChangeAspect="1" noChangeArrowheads="1"/>
-          </p:cNvPicPr>
+        </p:spPr>
+        <p:txBody>
+          <a:bodyPr wrap="none" rtlCol="0">
+            <a:spAutoFit/>
+          </a:bodyPr>
+          <a:lstStyle/>
+          <a:p>
+            <a:r>
+              <a:rPr lang="en-US" dirty="0"/>
+              <a:t>Autoencoder (final decoded)</a:t>
+            </a:r>
+          </a:p>
+        </p:txBody>
+      </p:sp>
+      <p:sp>
+        <p:nvSpPr>
+          <p:cNvPr id="5" name="TextBox 4">
+            <a:extLst>
+              <a:ext uri="{FF2B5EF4-FFF2-40B4-BE49-F238E27FC236}">
+                <a16:creationId xmlns:a16="http://schemas.microsoft.com/office/drawing/2014/main" id="{30DC4815-1F4A-4D42-8D5A-096FE2B91459}"/>
+              </a:ext>
+            </a:extLst>
+          </p:cNvPr>
+          <p:cNvSpPr txBox="1"/>
           <p:nvPr/>
-        </p:nvPicPr>
-        <p:blipFill>
-          <a:blip r:embed="rId5">
-            <a:extLst>
-              <a:ext uri="{28A0092B-C50C-407E-A947-70E740481C1C}">
-                <a14:useLocalDpi xmlns:a14="http://schemas.microsoft.com/office/drawing/2010/main" val="0"/>
-              </a:ext>
-            </a:extLst>
-          </a:blip>
-          <a:srcRect/>
-          <a:stretch>
-            <a:fillRect/>
-          </a:stretch>
-        </p:blipFill>
-        <p:spPr bwMode="auto">
-          <a:xfrm>
-            <a:off x="656273" y="2947670"/>
-            <a:ext cx="2876550" cy="2514600"/>
+        </p:nvSpPr>
+        <p:spPr>
+          <a:xfrm>
+            <a:off x="5354320" y="3291840"/>
+            <a:ext cx="998671" cy="369332"/>
           </a:xfrm>
           <a:prstGeom prst="rect">
             <a:avLst/>
           </a:prstGeom>
           <a:noFill/>
-          <a:extLst>
-            <a:ext uri="{909E8E84-426E-40DD-AFC4-6F175D3DCCD1}">
-              <a14:hiddenFill xmlns:a14="http://schemas.microsoft.com/office/drawing/2010/main">
-                <a:solidFill>
-                  <a:srgbClr val="FFFFFF"/>
-                </a:solidFill>
-              </a14:hiddenFill>
-            </a:ext>
-          </a:extLst>
-        </p:spPr>
-      </p:pic>
-      <p:pic>
-        <p:nvPicPr>
-          <p:cNvPr id="1034" name="Picture 10">
-            <a:extLst>
-              <a:ext uri="{FF2B5EF4-FFF2-40B4-BE49-F238E27FC236}">
-                <a16:creationId xmlns:a16="http://schemas.microsoft.com/office/drawing/2014/main" id="{1989C5A8-1F13-4C62-847E-959C112269F4}"/>
-              </a:ext>
-            </a:extLst>
-          </p:cNvPr>
-          <p:cNvPicPr>
-            <a:picLocks noChangeAspect="1" noChangeArrowheads="1"/>
-          </p:cNvPicPr>
+        </p:spPr>
+        <p:txBody>
+          <a:bodyPr wrap="none" rtlCol="0">
+            <a:spAutoFit/>
+          </a:bodyPr>
+          <a:lstStyle/>
+          <a:p>
+            <a:r>
+              <a:rPr lang="en-US" dirty="0"/>
+              <a:t>encoded</a:t>
+            </a:r>
+          </a:p>
+        </p:txBody>
+      </p:sp>
+      <p:sp>
+        <p:nvSpPr>
+          <p:cNvPr id="6" name="TextBox 5">
+            <a:extLst>
+              <a:ext uri="{FF2B5EF4-FFF2-40B4-BE49-F238E27FC236}">
+                <a16:creationId xmlns:a16="http://schemas.microsoft.com/office/drawing/2014/main" id="{67BA2447-38B6-4221-871A-314CFBA6D88A}"/>
+              </a:ext>
+            </a:extLst>
+          </p:cNvPr>
+          <p:cNvSpPr txBox="1"/>
           <p:nvPr/>
-        </p:nvPicPr>
-        <p:blipFill>
-          <a:blip r:embed="rId6">
-            <a:extLst>
-              <a:ext uri="{28A0092B-C50C-407E-A947-70E740481C1C}">
-                <a14:useLocalDpi xmlns:a14="http://schemas.microsoft.com/office/drawing/2010/main" val="0"/>
-              </a:ext>
-            </a:extLst>
-          </a:blip>
-          <a:srcRect/>
-          <a:stretch>
-            <a:fillRect/>
-          </a:stretch>
-        </p:blipFill>
-        <p:spPr bwMode="auto">
-          <a:xfrm>
-            <a:off x="3712845" y="2947670"/>
-            <a:ext cx="2933700" cy="2514600"/>
+        </p:nvSpPr>
+        <p:spPr>
+          <a:xfrm>
+            <a:off x="9133840" y="1544320"/>
+            <a:ext cx="2570480" cy="1200329"/>
           </a:xfrm>
           <a:prstGeom prst="rect">
             <a:avLst/>
           </a:prstGeom>
           <a:noFill/>
-          <a:extLst>
-            <a:ext uri="{909E8E84-426E-40DD-AFC4-6F175D3DCCD1}">
-              <a14:hiddenFill xmlns:a14="http://schemas.microsoft.com/office/drawing/2010/main">
-                <a:solidFill>
-                  <a:srgbClr val="FFFFFF"/>
-                </a:solidFill>
-              </a14:hiddenFill>
-            </a:ext>
-          </a:extLst>
-        </p:spPr>
-      </p:pic>
+        </p:spPr>
+        <p:txBody>
+          <a:bodyPr wrap="square" rtlCol="0">
+            <a:spAutoFit/>
+          </a:bodyPr>
+          <a:lstStyle/>
+          <a:p>
+            <a:r>
+              <a:rPr lang="en-US" dirty="0"/>
+              <a:t>Based on our structure of the </a:t>
+            </a:r>
+            <a:r>
+              <a:rPr lang="en-US" dirty="0" err="1"/>
+              <a:t>cnn</a:t>
+            </a:r>
+            <a:r>
+              <a:rPr lang="en-US" dirty="0"/>
+              <a:t>, we need data 2^n – 1 (original data 127x127, smallest is 3x3)</a:t>
+            </a:r>
+          </a:p>
+        </p:txBody>
+      </p:sp>
     </p:spTree>
     <p:extLst>
       <p:ext uri="{BB962C8B-B14F-4D97-AF65-F5344CB8AC3E}">
-        <p14:creationId xmlns:p14="http://schemas.microsoft.com/office/powerpoint/2010/main" val="4013676717"/>
+        <p14:creationId xmlns:p14="http://schemas.microsoft.com/office/powerpoint/2010/main" val="3079746576"/>
       </p:ext>
     </p:extLst>
   </p:cSld>
@@ -5552,40 +6228,12 @@
           <a:chExt cx="0" cy="0"/>
         </a:xfrm>
       </p:grpSpPr>
-      <p:sp>
-        <p:nvSpPr>
-          <p:cNvPr id="2" name="Title 1">
-            <a:extLst>
-              <a:ext uri="{FF2B5EF4-FFF2-40B4-BE49-F238E27FC236}">
-                <a16:creationId xmlns:a16="http://schemas.microsoft.com/office/drawing/2014/main" id="{655D6C05-EC7A-4108-8D18-6DA6473C2516}"/>
-              </a:ext>
-            </a:extLst>
-          </p:cNvPr>
-          <p:cNvSpPr>
-            <a:spLocks noGrp="1"/>
-          </p:cNvSpPr>
-          <p:nvPr>
-            <p:ph type="title"/>
-          </p:nvPr>
-        </p:nvSpPr>
-        <p:spPr/>
-        <p:txBody>
-          <a:bodyPr/>
-          <a:lstStyle/>
-          <a:p>
-            <a:r>
-              <a:rPr lang="en-US" dirty="0"/>
-              <a:t>Resolved maps</a:t>
-            </a:r>
-          </a:p>
-        </p:txBody>
-      </p:sp>
       <p:pic>
         <p:nvPicPr>
-          <p:cNvPr id="2050" name="Picture 2">
-            <a:extLst>
-              <a:ext uri="{FF2B5EF4-FFF2-40B4-BE49-F238E27FC236}">
-                <a16:creationId xmlns:a16="http://schemas.microsoft.com/office/drawing/2014/main" id="{813CE9E5-50A3-4B35-935C-C2AE9827454C}"/>
+          <p:cNvPr id="1026" name="Picture 2">
+            <a:extLst>
+              <a:ext uri="{FF2B5EF4-FFF2-40B4-BE49-F238E27FC236}">
+                <a16:creationId xmlns:a16="http://schemas.microsoft.com/office/drawing/2014/main" id="{D271FE50-61CE-4F9E-9434-DF7286857300}"/>
               </a:ext>
             </a:extLst>
           </p:cNvPr>
@@ -5609,8 +6257,8 @@
         </p:blipFill>
         <p:spPr bwMode="auto">
           <a:xfrm>
-            <a:off x="142875" y="1690688"/>
-            <a:ext cx="3048000" cy="2514600"/>
+            <a:off x="304800" y="209550"/>
+            <a:ext cx="2990850" cy="2514600"/>
           </a:xfrm>
           <a:prstGeom prst="rect">
             <a:avLst/>
@@ -5629,10 +6277,10 @@
       </p:pic>
       <p:pic>
         <p:nvPicPr>
-          <p:cNvPr id="2052" name="Picture 4">
-            <a:extLst>
-              <a:ext uri="{FF2B5EF4-FFF2-40B4-BE49-F238E27FC236}">
-                <a16:creationId xmlns:a16="http://schemas.microsoft.com/office/drawing/2014/main" id="{184B9D9E-78EE-4E6B-8A33-25D90EF9D464}"/>
+          <p:cNvPr id="1028" name="Picture 4">
+            <a:extLst>
+              <a:ext uri="{FF2B5EF4-FFF2-40B4-BE49-F238E27FC236}">
+                <a16:creationId xmlns:a16="http://schemas.microsoft.com/office/drawing/2014/main" id="{1D4F1EF1-2482-418F-9050-4BED1092A09C}"/>
               </a:ext>
             </a:extLst>
           </p:cNvPr>
@@ -5656,8 +6304,8 @@
         </p:blipFill>
         <p:spPr bwMode="auto">
           <a:xfrm>
-            <a:off x="3190875" y="1690688"/>
-            <a:ext cx="2981325" cy="2514600"/>
+            <a:off x="3390900" y="209550"/>
+            <a:ext cx="3162300" cy="2514600"/>
           </a:xfrm>
           <a:prstGeom prst="rect">
             <a:avLst/>
@@ -5676,10 +6324,10 @@
       </p:pic>
       <p:pic>
         <p:nvPicPr>
-          <p:cNvPr id="2054" name="Picture 6">
-            <a:extLst>
-              <a:ext uri="{FF2B5EF4-FFF2-40B4-BE49-F238E27FC236}">
-                <a16:creationId xmlns:a16="http://schemas.microsoft.com/office/drawing/2014/main" id="{985B25BE-4B55-404F-80EB-C3403746F43F}"/>
+          <p:cNvPr id="1030" name="Picture 6">
+            <a:extLst>
+              <a:ext uri="{FF2B5EF4-FFF2-40B4-BE49-F238E27FC236}">
+                <a16:creationId xmlns:a16="http://schemas.microsoft.com/office/drawing/2014/main" id="{57060197-1CD2-4299-ACAC-53DC2784B539}"/>
               </a:ext>
             </a:extLst>
           </p:cNvPr>
@@ -5703,8 +6351,8 @@
         </p:blipFill>
         <p:spPr bwMode="auto">
           <a:xfrm>
-            <a:off x="6238875" y="1690688"/>
-            <a:ext cx="2809875" cy="2514600"/>
+            <a:off x="6646545" y="433070"/>
+            <a:ext cx="3105150" cy="2514600"/>
           </a:xfrm>
           <a:prstGeom prst="rect">
             <a:avLst/>
@@ -5723,10 +6371,10 @@
       </p:pic>
       <p:pic>
         <p:nvPicPr>
-          <p:cNvPr id="2056" name="Picture 8">
-            <a:extLst>
-              <a:ext uri="{FF2B5EF4-FFF2-40B4-BE49-F238E27FC236}">
-                <a16:creationId xmlns:a16="http://schemas.microsoft.com/office/drawing/2014/main" id="{2ECB46EA-2275-4C6F-B48C-ECFD2E2C3082}"/>
+          <p:cNvPr id="1032" name="Picture 8">
+            <a:extLst>
+              <a:ext uri="{FF2B5EF4-FFF2-40B4-BE49-F238E27FC236}">
+                <a16:creationId xmlns:a16="http://schemas.microsoft.com/office/drawing/2014/main" id="{478772BB-401C-4AA2-968B-DCD8A9FE90B7}"/>
               </a:ext>
             </a:extLst>
           </p:cNvPr>
@@ -5750,7 +6398,7 @@
         </p:blipFill>
         <p:spPr bwMode="auto">
           <a:xfrm>
-            <a:off x="9048750" y="1690688"/>
+            <a:off x="656273" y="2947670"/>
             <a:ext cx="2876550" cy="2514600"/>
           </a:xfrm>
           <a:prstGeom prst="rect">
@@ -5770,10 +6418,10 @@
       </p:pic>
       <p:pic>
         <p:nvPicPr>
-          <p:cNvPr id="8" name="Picture 4">
-            <a:extLst>
-              <a:ext uri="{FF2B5EF4-FFF2-40B4-BE49-F238E27FC236}">
-                <a16:creationId xmlns:a16="http://schemas.microsoft.com/office/drawing/2014/main" id="{B1A92860-4218-47F9-A33D-5E2D78CD7C5A}"/>
+          <p:cNvPr id="1034" name="Picture 10">
+            <a:extLst>
+              <a:ext uri="{FF2B5EF4-FFF2-40B4-BE49-F238E27FC236}">
+                <a16:creationId xmlns:a16="http://schemas.microsoft.com/office/drawing/2014/main" id="{1989C5A8-1F13-4C62-847E-959C112269F4}"/>
               </a:ext>
             </a:extLst>
           </p:cNvPr>
@@ -5797,8 +6445,8 @@
         </p:blipFill>
         <p:spPr bwMode="auto">
           <a:xfrm>
-            <a:off x="-31591" y="4040029"/>
-            <a:ext cx="3162300" cy="2514600"/>
+            <a:off x="3712845" y="2947670"/>
+            <a:ext cx="2933700" cy="2514600"/>
           </a:xfrm>
           <a:prstGeom prst="rect">
             <a:avLst/>
@@ -5815,12 +6463,70 @@
           </a:extLst>
         </p:spPr>
       </p:pic>
+    </p:spTree>
+    <p:extLst>
+      <p:ext uri="{BB962C8B-B14F-4D97-AF65-F5344CB8AC3E}">
+        <p14:creationId xmlns:p14="http://schemas.microsoft.com/office/powerpoint/2010/main" val="4013676717"/>
+      </p:ext>
+    </p:extLst>
+  </p:cSld>
+  <p:clrMapOvr>
+    <a:masterClrMapping/>
+  </p:clrMapOvr>
+</p:sld>
+</file>
+
+<file path=ppt/slides/slide9.xml><?xml version="1.0" encoding="utf-8"?>
+<p:sld xmlns:a="http://schemas.openxmlformats.org/drawingml/2006/main" xmlns:r="http://schemas.openxmlformats.org/officeDocument/2006/relationships" xmlns:p="http://schemas.openxmlformats.org/presentationml/2006/main">
+  <p:cSld>
+    <p:spTree>
+      <p:nvGrpSpPr>
+        <p:cNvPr id="1" name=""/>
+        <p:cNvGrpSpPr/>
+        <p:nvPr/>
+      </p:nvGrpSpPr>
+      <p:grpSpPr>
+        <a:xfrm>
+          <a:off x="0" y="0"/>
+          <a:ext cx="0" cy="0"/>
+          <a:chOff x="0" y="0"/>
+          <a:chExt cx="0" cy="0"/>
+        </a:xfrm>
+      </p:grpSpPr>
+      <p:sp>
+        <p:nvSpPr>
+          <p:cNvPr id="2" name="Title 1">
+            <a:extLst>
+              <a:ext uri="{FF2B5EF4-FFF2-40B4-BE49-F238E27FC236}">
+                <a16:creationId xmlns:a16="http://schemas.microsoft.com/office/drawing/2014/main" id="{655D6C05-EC7A-4108-8D18-6DA6473C2516}"/>
+              </a:ext>
+            </a:extLst>
+          </p:cNvPr>
+          <p:cNvSpPr>
+            <a:spLocks noGrp="1"/>
+          </p:cNvSpPr>
+          <p:nvPr>
+            <p:ph type="title"/>
+          </p:nvPr>
+        </p:nvSpPr>
+        <p:spPr/>
+        <p:txBody>
+          <a:bodyPr/>
+          <a:lstStyle/>
+          <a:p>
+            <a:r>
+              <a:rPr lang="en-US" dirty="0"/>
+              <a:t>Resolved maps</a:t>
+            </a:r>
+          </a:p>
+        </p:txBody>
+      </p:sp>
       <p:pic>
         <p:nvPicPr>
-          <p:cNvPr id="9" name="Picture 6">
-            <a:extLst>
-              <a:ext uri="{FF2B5EF4-FFF2-40B4-BE49-F238E27FC236}">
-                <a16:creationId xmlns:a16="http://schemas.microsoft.com/office/drawing/2014/main" id="{74812B3F-C72E-4101-B5F0-B5BDF2A385DA}"/>
+          <p:cNvPr id="2050" name="Picture 2">
+            <a:extLst>
+              <a:ext uri="{FF2B5EF4-FFF2-40B4-BE49-F238E27FC236}">
+                <a16:creationId xmlns:a16="http://schemas.microsoft.com/office/drawing/2014/main" id="{813CE9E5-50A3-4B35-935C-C2AE9827454C}"/>
               </a:ext>
             </a:extLst>
           </p:cNvPr>
@@ -5830,7 +6536,7 @@
           <p:nvPr/>
         </p:nvPicPr>
         <p:blipFill>
-          <a:blip r:embed="rId7">
+          <a:blip r:embed="rId2">
             <a:extLst>
               <a:ext uri="{28A0092B-C50C-407E-A947-70E740481C1C}">
                 <a14:useLocalDpi xmlns:a14="http://schemas.microsoft.com/office/drawing/2010/main" val="0"/>
@@ -5844,8 +6550,8 @@
         </p:blipFill>
         <p:spPr bwMode="auto">
           <a:xfrm>
-            <a:off x="3020854" y="4100830"/>
-            <a:ext cx="3105150" cy="2514600"/>
+            <a:off x="142875" y="1690688"/>
+            <a:ext cx="3048000" cy="2514600"/>
           </a:xfrm>
           <a:prstGeom prst="rect">
             <a:avLst/>
@@ -5864,10 +6570,10 @@
       </p:pic>
       <p:pic>
         <p:nvPicPr>
-          <p:cNvPr id="10" name="Picture 8">
-            <a:extLst>
-              <a:ext uri="{FF2B5EF4-FFF2-40B4-BE49-F238E27FC236}">
-                <a16:creationId xmlns:a16="http://schemas.microsoft.com/office/drawing/2014/main" id="{5AC6F749-BB15-4B4C-A88B-AA8127ED0FE0}"/>
+          <p:cNvPr id="2052" name="Picture 4">
+            <a:extLst>
+              <a:ext uri="{FF2B5EF4-FFF2-40B4-BE49-F238E27FC236}">
+                <a16:creationId xmlns:a16="http://schemas.microsoft.com/office/drawing/2014/main" id="{184B9D9E-78EE-4E6B-8A33-25D90EF9D464}"/>
               </a:ext>
             </a:extLst>
           </p:cNvPr>
@@ -5877,7 +6583,7 @@
           <p:nvPr/>
         </p:nvPicPr>
         <p:blipFill>
-          <a:blip r:embed="rId8">
+          <a:blip r:embed="rId3">
             <a:extLst>
               <a:ext uri="{28A0092B-C50C-407E-A947-70E740481C1C}">
                 <a14:useLocalDpi xmlns:a14="http://schemas.microsoft.com/office/drawing/2010/main" val="0"/>
@@ -5891,8 +6597,8 @@
         </p:blipFill>
         <p:spPr bwMode="auto">
           <a:xfrm>
-            <a:off x="6059329" y="4205288"/>
-            <a:ext cx="2876550" cy="2514600"/>
+            <a:off x="3190875" y="1690688"/>
+            <a:ext cx="2981325" cy="2514600"/>
           </a:xfrm>
           <a:prstGeom prst="rect">
             <a:avLst/>
@@ -5911,10 +6617,10 @@
       </p:pic>
       <p:pic>
         <p:nvPicPr>
-          <p:cNvPr id="11" name="Picture 10">
-            <a:extLst>
-              <a:ext uri="{FF2B5EF4-FFF2-40B4-BE49-F238E27FC236}">
-                <a16:creationId xmlns:a16="http://schemas.microsoft.com/office/drawing/2014/main" id="{4B989E9C-08B7-409C-A5EF-474B97386739}"/>
+          <p:cNvPr id="2054" name="Picture 6">
+            <a:extLst>
+              <a:ext uri="{FF2B5EF4-FFF2-40B4-BE49-F238E27FC236}">
+                <a16:creationId xmlns:a16="http://schemas.microsoft.com/office/drawing/2014/main" id="{985B25BE-4B55-404F-80EB-C3403746F43F}"/>
               </a:ext>
             </a:extLst>
           </p:cNvPr>
@@ -5924,7 +6630,7 @@
           <p:nvPr/>
         </p:nvPicPr>
         <p:blipFill>
-          <a:blip r:embed="rId9">
+          <a:blip r:embed="rId4">
             <a:extLst>
               <a:ext uri="{28A0092B-C50C-407E-A947-70E740481C1C}">
                 <a14:useLocalDpi xmlns:a14="http://schemas.microsoft.com/office/drawing/2010/main" val="0"/>
@@ -5938,8 +6644,8 @@
         </p:blipFill>
         <p:spPr bwMode="auto">
           <a:xfrm>
-            <a:off x="8910320" y="4205288"/>
-            <a:ext cx="2933700" cy="2514600"/>
+            <a:off x="6238875" y="1690688"/>
+            <a:ext cx="2809875" cy="2514600"/>
           </a:xfrm>
           <a:prstGeom prst="rect">
             <a:avLst/>
@@ -5956,6 +6662,276 @@
           </a:extLst>
         </p:spPr>
       </p:pic>
+      <p:pic>
+        <p:nvPicPr>
+          <p:cNvPr id="2056" name="Picture 8">
+            <a:extLst>
+              <a:ext uri="{FF2B5EF4-FFF2-40B4-BE49-F238E27FC236}">
+                <a16:creationId xmlns:a16="http://schemas.microsoft.com/office/drawing/2014/main" id="{2ECB46EA-2275-4C6F-B48C-ECFD2E2C3082}"/>
+              </a:ext>
+            </a:extLst>
+          </p:cNvPr>
+          <p:cNvPicPr>
+            <a:picLocks noChangeAspect="1" noChangeArrowheads="1"/>
+          </p:cNvPicPr>
+          <p:nvPr/>
+        </p:nvPicPr>
+        <p:blipFill>
+          <a:blip r:embed="rId5">
+            <a:extLst>
+              <a:ext uri="{28A0092B-C50C-407E-A947-70E740481C1C}">
+                <a14:useLocalDpi xmlns:a14="http://schemas.microsoft.com/office/drawing/2010/main" val="0"/>
+              </a:ext>
+            </a:extLst>
+          </a:blip>
+          <a:srcRect/>
+          <a:stretch>
+            <a:fillRect/>
+          </a:stretch>
+        </p:blipFill>
+        <p:spPr bwMode="auto">
+          <a:xfrm>
+            <a:off x="9048750" y="1690688"/>
+            <a:ext cx="2876550" cy="2514600"/>
+          </a:xfrm>
+          <a:prstGeom prst="rect">
+            <a:avLst/>
+          </a:prstGeom>
+          <a:noFill/>
+          <a:extLst>
+            <a:ext uri="{909E8E84-426E-40DD-AFC4-6F175D3DCCD1}">
+              <a14:hiddenFill xmlns:a14="http://schemas.microsoft.com/office/drawing/2010/main">
+                <a:solidFill>
+                  <a:srgbClr val="FFFFFF"/>
+                </a:solidFill>
+              </a14:hiddenFill>
+            </a:ext>
+          </a:extLst>
+        </p:spPr>
+      </p:pic>
+      <p:pic>
+        <p:nvPicPr>
+          <p:cNvPr id="8" name="Picture 4">
+            <a:extLst>
+              <a:ext uri="{FF2B5EF4-FFF2-40B4-BE49-F238E27FC236}">
+                <a16:creationId xmlns:a16="http://schemas.microsoft.com/office/drawing/2014/main" id="{B1A92860-4218-47F9-A33D-5E2D78CD7C5A}"/>
+              </a:ext>
+            </a:extLst>
+          </p:cNvPr>
+          <p:cNvPicPr>
+            <a:picLocks noChangeAspect="1" noChangeArrowheads="1"/>
+          </p:cNvPicPr>
+          <p:nvPr/>
+        </p:nvPicPr>
+        <p:blipFill>
+          <a:blip r:embed="rId6">
+            <a:extLst>
+              <a:ext uri="{28A0092B-C50C-407E-A947-70E740481C1C}">
+                <a14:useLocalDpi xmlns:a14="http://schemas.microsoft.com/office/drawing/2010/main" val="0"/>
+              </a:ext>
+            </a:extLst>
+          </a:blip>
+          <a:srcRect/>
+          <a:stretch>
+            <a:fillRect/>
+          </a:stretch>
+        </p:blipFill>
+        <p:spPr bwMode="auto">
+          <a:xfrm>
+            <a:off x="-31591" y="4040029"/>
+            <a:ext cx="3162300" cy="2514600"/>
+          </a:xfrm>
+          <a:prstGeom prst="rect">
+            <a:avLst/>
+          </a:prstGeom>
+          <a:noFill/>
+          <a:extLst>
+            <a:ext uri="{909E8E84-426E-40DD-AFC4-6F175D3DCCD1}">
+              <a14:hiddenFill xmlns:a14="http://schemas.microsoft.com/office/drawing/2010/main">
+                <a:solidFill>
+                  <a:srgbClr val="FFFFFF"/>
+                </a:solidFill>
+              </a14:hiddenFill>
+            </a:ext>
+          </a:extLst>
+        </p:spPr>
+      </p:pic>
+      <p:pic>
+        <p:nvPicPr>
+          <p:cNvPr id="9" name="Picture 6">
+            <a:extLst>
+              <a:ext uri="{FF2B5EF4-FFF2-40B4-BE49-F238E27FC236}">
+                <a16:creationId xmlns:a16="http://schemas.microsoft.com/office/drawing/2014/main" id="{74812B3F-C72E-4101-B5F0-B5BDF2A385DA}"/>
+              </a:ext>
+            </a:extLst>
+          </p:cNvPr>
+          <p:cNvPicPr>
+            <a:picLocks noChangeAspect="1" noChangeArrowheads="1"/>
+          </p:cNvPicPr>
+          <p:nvPr/>
+        </p:nvPicPr>
+        <p:blipFill>
+          <a:blip r:embed="rId7">
+            <a:extLst>
+              <a:ext uri="{28A0092B-C50C-407E-A947-70E740481C1C}">
+                <a14:useLocalDpi xmlns:a14="http://schemas.microsoft.com/office/drawing/2010/main" val="0"/>
+              </a:ext>
+            </a:extLst>
+          </a:blip>
+          <a:srcRect/>
+          <a:stretch>
+            <a:fillRect/>
+          </a:stretch>
+        </p:blipFill>
+        <p:spPr bwMode="auto">
+          <a:xfrm>
+            <a:off x="3020854" y="4100830"/>
+            <a:ext cx="3105150" cy="2514600"/>
+          </a:xfrm>
+          <a:prstGeom prst="rect">
+            <a:avLst/>
+          </a:prstGeom>
+          <a:noFill/>
+          <a:extLst>
+            <a:ext uri="{909E8E84-426E-40DD-AFC4-6F175D3DCCD1}">
+              <a14:hiddenFill xmlns:a14="http://schemas.microsoft.com/office/drawing/2010/main">
+                <a:solidFill>
+                  <a:srgbClr val="FFFFFF"/>
+                </a:solidFill>
+              </a14:hiddenFill>
+            </a:ext>
+          </a:extLst>
+        </p:spPr>
+      </p:pic>
+      <p:pic>
+        <p:nvPicPr>
+          <p:cNvPr id="10" name="Picture 8">
+            <a:extLst>
+              <a:ext uri="{FF2B5EF4-FFF2-40B4-BE49-F238E27FC236}">
+                <a16:creationId xmlns:a16="http://schemas.microsoft.com/office/drawing/2014/main" id="{5AC6F749-BB15-4B4C-A88B-AA8127ED0FE0}"/>
+              </a:ext>
+            </a:extLst>
+          </p:cNvPr>
+          <p:cNvPicPr>
+            <a:picLocks noChangeAspect="1" noChangeArrowheads="1"/>
+          </p:cNvPicPr>
+          <p:nvPr/>
+        </p:nvPicPr>
+        <p:blipFill>
+          <a:blip r:embed="rId8">
+            <a:extLst>
+              <a:ext uri="{28A0092B-C50C-407E-A947-70E740481C1C}">
+                <a14:useLocalDpi xmlns:a14="http://schemas.microsoft.com/office/drawing/2010/main" val="0"/>
+              </a:ext>
+            </a:extLst>
+          </a:blip>
+          <a:srcRect/>
+          <a:stretch>
+            <a:fillRect/>
+          </a:stretch>
+        </p:blipFill>
+        <p:spPr bwMode="auto">
+          <a:xfrm>
+            <a:off x="6059329" y="4205288"/>
+            <a:ext cx="2876550" cy="2514600"/>
+          </a:xfrm>
+          <a:prstGeom prst="rect">
+            <a:avLst/>
+          </a:prstGeom>
+          <a:noFill/>
+          <a:extLst>
+            <a:ext uri="{909E8E84-426E-40DD-AFC4-6F175D3DCCD1}">
+              <a14:hiddenFill xmlns:a14="http://schemas.microsoft.com/office/drawing/2010/main">
+                <a:solidFill>
+                  <a:srgbClr val="FFFFFF"/>
+                </a:solidFill>
+              </a14:hiddenFill>
+            </a:ext>
+          </a:extLst>
+        </p:spPr>
+      </p:pic>
+      <p:pic>
+        <p:nvPicPr>
+          <p:cNvPr id="11" name="Picture 10">
+            <a:extLst>
+              <a:ext uri="{FF2B5EF4-FFF2-40B4-BE49-F238E27FC236}">
+                <a16:creationId xmlns:a16="http://schemas.microsoft.com/office/drawing/2014/main" id="{4B989E9C-08B7-409C-A5EF-474B97386739}"/>
+              </a:ext>
+            </a:extLst>
+          </p:cNvPr>
+          <p:cNvPicPr>
+            <a:picLocks noChangeAspect="1" noChangeArrowheads="1"/>
+          </p:cNvPicPr>
+          <p:nvPr/>
+        </p:nvPicPr>
+        <p:blipFill>
+          <a:blip r:embed="rId9">
+            <a:extLst>
+              <a:ext uri="{28A0092B-C50C-407E-A947-70E740481C1C}">
+                <a14:useLocalDpi xmlns:a14="http://schemas.microsoft.com/office/drawing/2010/main" val="0"/>
+              </a:ext>
+            </a:extLst>
+          </a:blip>
+          <a:srcRect/>
+          <a:stretch>
+            <a:fillRect/>
+          </a:stretch>
+        </p:blipFill>
+        <p:spPr bwMode="auto">
+          <a:xfrm>
+            <a:off x="8910320" y="4205288"/>
+            <a:ext cx="2933700" cy="2514600"/>
+          </a:xfrm>
+          <a:prstGeom prst="rect">
+            <a:avLst/>
+          </a:prstGeom>
+          <a:noFill/>
+          <a:extLst>
+            <a:ext uri="{909E8E84-426E-40DD-AFC4-6F175D3DCCD1}">
+              <a14:hiddenFill xmlns:a14="http://schemas.microsoft.com/office/drawing/2010/main">
+                <a:solidFill>
+                  <a:srgbClr val="FFFFFF"/>
+                </a:solidFill>
+              </a14:hiddenFill>
+            </a:ext>
+          </a:extLst>
+        </p:spPr>
+      </p:pic>
+      <p:sp>
+        <p:nvSpPr>
+          <p:cNvPr id="4" name="TextBox 3">
+            <a:extLst>
+              <a:ext uri="{FF2B5EF4-FFF2-40B4-BE49-F238E27FC236}">
+                <a16:creationId xmlns:a16="http://schemas.microsoft.com/office/drawing/2014/main" id="{448F9F1A-9E05-47CB-8659-DA439FB6212D}"/>
+              </a:ext>
+            </a:extLst>
+          </p:cNvPr>
+          <p:cNvSpPr txBox="1"/>
+          <p:nvPr/>
+        </p:nvSpPr>
+        <p:spPr>
+          <a:xfrm>
+            <a:off x="10962167" y="712381"/>
+            <a:ext cx="3048001" cy="1200329"/>
+          </a:xfrm>
+          <a:prstGeom prst="rect">
+            <a:avLst/>
+          </a:prstGeom>
+          <a:noFill/>
+        </p:spPr>
+        <p:txBody>
+          <a:bodyPr wrap="square" rtlCol="0">
+            <a:spAutoFit/>
+          </a:bodyPr>
+          <a:lstStyle/>
+          <a:p>
+            <a:r>
+              <a:rPr lang="en-US" dirty="0"/>
+              <a:t>When refining the model, should I make any assumptions about blocks being the same next work?</a:t>
+            </a:r>
+          </a:p>
+        </p:txBody>
+      </p:sp>
     </p:spTree>
     <p:extLst>
       <p:ext uri="{BB962C8B-B14F-4D97-AF65-F5344CB8AC3E}">

</xml_diff>